<commit_message>
Updated code and powerpoint
</commit_message>
<xml_diff>
--- a/Bank Marketing Campaign.pptx
+++ b/Bank Marketing Campaign.pptx
@@ -13,14 +13,16 @@
     <p:sldId id="263" r:id="rId7"/>
     <p:sldId id="264" r:id="rId8"/>
     <p:sldId id="265" r:id="rId9"/>
-    <p:sldId id="266" r:id="rId10"/>
-    <p:sldId id="267" r:id="rId11"/>
-    <p:sldId id="268" r:id="rId12"/>
-    <p:sldId id="273" r:id="rId13"/>
-    <p:sldId id="269" r:id="rId14"/>
-    <p:sldId id="270" r:id="rId15"/>
-    <p:sldId id="271" r:id="rId16"/>
-    <p:sldId id="272" r:id="rId17"/>
+    <p:sldId id="276" r:id="rId10"/>
+    <p:sldId id="278" r:id="rId11"/>
+    <p:sldId id="277" r:id="rId12"/>
+    <p:sldId id="266" r:id="rId13"/>
+    <p:sldId id="274" r:id="rId14"/>
+    <p:sldId id="267" r:id="rId15"/>
+    <p:sldId id="275" r:id="rId16"/>
+    <p:sldId id="269" r:id="rId17"/>
+    <p:sldId id="270" r:id="rId18"/>
+    <p:sldId id="272" r:id="rId19"/>
   </p:sldIdLst>
   <p:sldSz cx="12192000" cy="6858000"/>
   <p:notesSz cx="6858000" cy="9144000"/>
@@ -119,6 +121,11 @@
       </a:defRPr>
     </a:lvl9pPr>
   </p:defaultTextStyle>
+  <p:extLst>
+    <p:ext uri="{EFAFB233-063F-42B5-8137-9DF3F51BA10A}">
+      <p15:sldGuideLst xmlns:p15="http://schemas.microsoft.com/office/powerpoint/2012/main"/>
+    </p:ext>
+  </p:extLst>
 </p:presentation>
 </file>
 
@@ -229,7 +236,7 @@
           <a:p>
             <a:fld id="{C764DE79-268F-4C1A-8933-263129D2AF90}" type="datetimeFigureOut">
               <a:rPr lang="en-US" dirty="0"/>
-              <a:t>9/23/2022</a:t>
+              <a:t>9/26/2022</a:t>
             </a:fld>
             <a:endParaRPr lang="en-US"/>
           </a:p>
@@ -419,7 +426,7 @@
           <a:p>
             <a:fld id="{C764DE79-268F-4C1A-8933-263129D2AF90}" type="datetimeFigureOut">
               <a:rPr lang="en-US" dirty="0"/>
-              <a:t>9/23/2022</a:t>
+              <a:t>9/26/2022</a:t>
             </a:fld>
             <a:endParaRPr lang="en-US"/>
           </a:p>
@@ -630,7 +637,7 @@
           <a:p>
             <a:fld id="{C764DE79-268F-4C1A-8933-263129D2AF90}" type="datetimeFigureOut">
               <a:rPr lang="en-US" dirty="0"/>
-              <a:t>9/23/2022</a:t>
+              <a:t>9/26/2022</a:t>
             </a:fld>
             <a:endParaRPr lang="en-US"/>
           </a:p>
@@ -1407,7 +1414,7 @@
                   <a:srgbClr val="FF6600"/>
                 </a:solidFill>
               </a:rPr>
-              <a:t>Random Forest</a:t>
+              <a:t>Exploratory Data Analysis</a:t>
             </a:r>
           </a:p>
         </p:txBody>
@@ -1441,13 +1448,6 @@
           </a:bodyPr>
           <a:lstStyle/>
           <a:p>
-            <a:endParaRPr lang="en-US" dirty="0">
-              <a:solidFill>
-                <a:srgbClr val="FF6600"/>
-              </a:solidFill>
-            </a:endParaRPr>
-          </a:p>
-          <a:p>
             <a:pPr lvl="1"/>
             <a:endParaRPr lang="en-US" sz="2000" dirty="0"/>
           </a:p>
@@ -1496,46 +1496,10 @@
           </a:prstGeom>
         </p:spPr>
       </p:pic>
-      <p:pic>
-        <p:nvPicPr>
-          <p:cNvPr id="6" name="Picture 5" descr="Chart, bar chart&#10;&#10;Description automatically generated">
-            <a:extLst>
-              <a:ext uri="{FF2B5EF4-FFF2-40B4-BE49-F238E27FC236}">
-                <a16:creationId xmlns:a16="http://schemas.microsoft.com/office/drawing/2014/main" id="{8040B325-770B-5BBA-4542-A93B6680CC86}"/>
-              </a:ext>
-            </a:extLst>
-          </p:cNvPr>
-          <p:cNvPicPr>
-            <a:picLocks noChangeAspect="1"/>
-          </p:cNvPicPr>
-          <p:nvPr/>
-        </p:nvPicPr>
-        <p:blipFill>
-          <a:blip r:embed="rId3">
-            <a:extLst>
-              <a:ext uri="{28A0092B-C50C-407E-A947-70E740481C1C}">
-                <a14:useLocalDpi xmlns:a14="http://schemas.microsoft.com/office/drawing/2010/main" val="0"/>
-              </a:ext>
-            </a:extLst>
-          </a:blip>
-          <a:stretch>
-            <a:fillRect/>
-          </a:stretch>
-        </p:blipFill>
-        <p:spPr>
-          <a:xfrm>
-            <a:off x="2587307" y="2506502"/>
-            <a:ext cx="7060317" cy="3631746"/>
-          </a:xfrm>
-          <a:prstGeom prst="rect">
-            <a:avLst/>
-          </a:prstGeom>
-        </p:spPr>
-      </p:pic>
     </p:spTree>
     <p:extLst>
       <p:ext uri="{BB962C8B-B14F-4D97-AF65-F5344CB8AC3E}">
-        <p14:creationId xmlns:p14="http://schemas.microsoft.com/office/powerpoint/2010/main" val="2661989101"/>
+        <p14:creationId xmlns:p14="http://schemas.microsoft.com/office/powerpoint/2010/main" val="547558736"/>
       </p:ext>
     </p:extLst>
   </p:cSld>
@@ -1607,7 +1571,7 @@
                   <a:srgbClr val="FF6600"/>
                 </a:solidFill>
               </a:rPr>
-              <a:t>Support Vector Machine</a:t>
+              <a:t>Exploratory Data Analysis</a:t>
             </a:r>
           </a:p>
         </p:txBody>
@@ -1641,13 +1605,6 @@
           </a:bodyPr>
           <a:lstStyle/>
           <a:p>
-            <a:endParaRPr lang="en-US" dirty="0">
-              <a:solidFill>
-                <a:srgbClr val="FF6600"/>
-              </a:solidFill>
-            </a:endParaRPr>
-          </a:p>
-          <a:p>
             <a:pPr lvl="1"/>
             <a:endParaRPr lang="en-US" sz="2000" dirty="0"/>
           </a:p>
@@ -1699,7 +1656,7 @@
     </p:spTree>
     <p:extLst>
       <p:ext uri="{BB962C8B-B14F-4D97-AF65-F5344CB8AC3E}">
-        <p14:creationId xmlns:p14="http://schemas.microsoft.com/office/powerpoint/2010/main" val="1715932472"/>
+        <p14:creationId xmlns:p14="http://schemas.microsoft.com/office/powerpoint/2010/main" val="4229592414"/>
       </p:ext>
     </p:extLst>
   </p:cSld>
@@ -1771,7 +1728,7 @@
                   <a:srgbClr val="FF6600"/>
                 </a:solidFill>
               </a:rPr>
-              <a:t>Naïve Bayes' Classifier</a:t>
+              <a:t>Logistic Regression Model</a:t>
             </a:r>
           </a:p>
         </p:txBody>
@@ -1860,10 +1817,82 @@
           </a:prstGeom>
         </p:spPr>
       </p:pic>
+      <p:pic>
+        <p:nvPicPr>
+          <p:cNvPr id="6" name="Picture 5" descr="Chart, bar chart&#10;&#10;Description automatically generated">
+            <a:extLst>
+              <a:ext uri="{FF2B5EF4-FFF2-40B4-BE49-F238E27FC236}">
+                <a16:creationId xmlns:a16="http://schemas.microsoft.com/office/drawing/2014/main" id="{21F55F23-8673-C5FA-464A-28EE0F762CA2}"/>
+              </a:ext>
+            </a:extLst>
+          </p:cNvPr>
+          <p:cNvPicPr>
+            <a:picLocks noChangeAspect="1"/>
+          </p:cNvPicPr>
+          <p:nvPr/>
+        </p:nvPicPr>
+        <p:blipFill>
+          <a:blip r:embed="rId3">
+            <a:extLst>
+              <a:ext uri="{28A0092B-C50C-407E-A947-70E740481C1C}">
+                <a14:useLocalDpi xmlns:a14="http://schemas.microsoft.com/office/drawing/2010/main" val="0"/>
+              </a:ext>
+            </a:extLst>
+          </a:blip>
+          <a:stretch>
+            <a:fillRect/>
+          </a:stretch>
+        </p:blipFill>
+        <p:spPr>
+          <a:xfrm>
+            <a:off x="598428" y="2086388"/>
+            <a:ext cx="5260007" cy="3631746"/>
+          </a:xfrm>
+          <a:prstGeom prst="rect">
+            <a:avLst/>
+          </a:prstGeom>
+        </p:spPr>
+      </p:pic>
+      <p:pic>
+        <p:nvPicPr>
+          <p:cNvPr id="8" name="Picture 7" descr="Chart&#10;&#10;Description automatically generated">
+            <a:extLst>
+              <a:ext uri="{FF2B5EF4-FFF2-40B4-BE49-F238E27FC236}">
+                <a16:creationId xmlns:a16="http://schemas.microsoft.com/office/drawing/2014/main" id="{DCD49042-9F42-3F38-D1F2-2A725E75D918}"/>
+              </a:ext>
+            </a:extLst>
+          </p:cNvPr>
+          <p:cNvPicPr>
+            <a:picLocks noChangeAspect="1"/>
+          </p:cNvPicPr>
+          <p:nvPr/>
+        </p:nvPicPr>
+        <p:blipFill>
+          <a:blip r:embed="rId4">
+            <a:extLst>
+              <a:ext uri="{28A0092B-C50C-407E-A947-70E740481C1C}">
+                <a14:useLocalDpi xmlns:a14="http://schemas.microsoft.com/office/drawing/2010/main" val="0"/>
+              </a:ext>
+            </a:extLst>
+          </a:blip>
+          <a:stretch>
+            <a:fillRect/>
+          </a:stretch>
+        </p:blipFill>
+        <p:spPr>
+          <a:xfrm>
+            <a:off x="6124442" y="2086388"/>
+            <a:ext cx="5619323" cy="3592753"/>
+          </a:xfrm>
+          <a:prstGeom prst="rect">
+            <a:avLst/>
+          </a:prstGeom>
+        </p:spPr>
+      </p:pic>
     </p:spTree>
     <p:extLst>
       <p:ext uri="{BB962C8B-B14F-4D97-AF65-F5344CB8AC3E}">
-        <p14:creationId xmlns:p14="http://schemas.microsoft.com/office/powerpoint/2010/main" val="2472995380"/>
+        <p14:creationId xmlns:p14="http://schemas.microsoft.com/office/powerpoint/2010/main" val="2725937870"/>
       </p:ext>
     </p:extLst>
   </p:cSld>
@@ -1923,20 +1952,25 @@
           <a:p>
             <a:pPr algn="ctr"/>
             <a:br>
-              <a:rPr lang="en-US" b="1" dirty="0">
+              <a:rPr lang="en-US" b="1">
                 <a:solidFill>
                   <a:srgbClr val="FF6600"/>
                 </a:solidFill>
               </a:rPr>
             </a:br>
             <a:r>
-              <a:rPr lang="en-US" b="1" dirty="0">
+              <a:rPr lang="en-US" b="1">
                 <a:solidFill>
                   <a:srgbClr val="FF6600"/>
                 </a:solidFill>
               </a:rPr>
-              <a:t>Artificial Neural Network</a:t>
-            </a:r>
+              <a:t>Logistic Regression Model</a:t>
+            </a:r>
+            <a:endParaRPr lang="en-US" b="1" dirty="0">
+              <a:solidFill>
+                <a:srgbClr val="FF6600"/>
+              </a:solidFill>
+            </a:endParaRPr>
           </a:p>
         </p:txBody>
       </p:sp>
@@ -1969,7 +2003,7 @@
           </a:bodyPr>
           <a:lstStyle/>
           <a:p>
-            <a:endParaRPr lang="en-US" dirty="0">
+            <a:endParaRPr lang="en-US">
               <a:solidFill>
                 <a:srgbClr val="FF6600"/>
               </a:solidFill>
@@ -1977,7 +2011,7 @@
           </a:p>
           <a:p>
             <a:pPr lvl="1"/>
-            <a:endParaRPr lang="en-US" sz="2000" dirty="0"/>
+            <a:endParaRPr lang="en-US" sz="2000"/>
           </a:p>
           <a:p>
             <a:endParaRPr lang="en-US" dirty="0">
@@ -2024,10 +2058,116 @@
           </a:prstGeom>
         </p:spPr>
       </p:pic>
+      <p:pic>
+        <p:nvPicPr>
+          <p:cNvPr id="6" name="Picture 5">
+            <a:extLst>
+              <a:ext uri="{FF2B5EF4-FFF2-40B4-BE49-F238E27FC236}">
+                <a16:creationId xmlns:a16="http://schemas.microsoft.com/office/drawing/2014/main" id="{21F55F23-8673-C5FA-464A-28EE0F762CA2}"/>
+              </a:ext>
+            </a:extLst>
+          </p:cNvPr>
+          <p:cNvPicPr>
+            <a:picLocks noChangeAspect="1"/>
+          </p:cNvPicPr>
+          <p:nvPr/>
+        </p:nvPicPr>
+        <p:blipFill>
+          <a:blip r:embed="rId3">
+            <a:extLst>
+              <a:ext uri="{28A0092B-C50C-407E-A947-70E740481C1C}">
+                <a14:useLocalDpi xmlns:a14="http://schemas.microsoft.com/office/drawing/2010/main" val="0"/>
+              </a:ext>
+            </a:extLst>
+          </a:blip>
+          <a:srcRect/>
+          <a:stretch/>
+        </p:blipFill>
+        <p:spPr>
+          <a:xfrm>
+            <a:off x="598428" y="2086388"/>
+            <a:ext cx="4511454" cy="3777383"/>
+          </a:xfrm>
+          <a:prstGeom prst="rect">
+            <a:avLst/>
+          </a:prstGeom>
+        </p:spPr>
+      </p:pic>
+      <p:pic>
+        <p:nvPicPr>
+          <p:cNvPr id="8" name="Picture 7">
+            <a:extLst>
+              <a:ext uri="{FF2B5EF4-FFF2-40B4-BE49-F238E27FC236}">
+                <a16:creationId xmlns:a16="http://schemas.microsoft.com/office/drawing/2014/main" id="{DCD49042-9F42-3F38-D1F2-2A725E75D918}"/>
+              </a:ext>
+            </a:extLst>
+          </p:cNvPr>
+          <p:cNvPicPr>
+            <a:picLocks noChangeAspect="1"/>
+          </p:cNvPicPr>
+          <p:nvPr/>
+        </p:nvPicPr>
+        <p:blipFill>
+          <a:blip r:embed="rId4">
+            <a:extLst>
+              <a:ext uri="{28A0092B-C50C-407E-A947-70E740481C1C}">
+                <a14:useLocalDpi xmlns:a14="http://schemas.microsoft.com/office/drawing/2010/main" val="0"/>
+              </a:ext>
+            </a:extLst>
+          </a:blip>
+          <a:srcRect/>
+          <a:stretch/>
+        </p:blipFill>
+        <p:spPr>
+          <a:xfrm>
+            <a:off x="5813612" y="2086388"/>
+            <a:ext cx="5541986" cy="3777383"/>
+          </a:xfrm>
+          <a:prstGeom prst="rect">
+            <a:avLst/>
+          </a:prstGeom>
+        </p:spPr>
+      </p:pic>
+      <p:sp>
+        <p:nvSpPr>
+          <p:cNvPr id="5" name="TextBox 4">
+            <a:extLst>
+              <a:ext uri="{FF2B5EF4-FFF2-40B4-BE49-F238E27FC236}">
+                <a16:creationId xmlns:a16="http://schemas.microsoft.com/office/drawing/2014/main" id="{E5C59C8A-C239-7465-CB80-A12DEDD9A6AF}"/>
+              </a:ext>
+            </a:extLst>
+          </p:cNvPr>
+          <p:cNvSpPr txBox="1"/>
+          <p:nvPr/>
+        </p:nvSpPr>
+        <p:spPr>
+          <a:xfrm>
+            <a:off x="1936376" y="5863771"/>
+            <a:ext cx="9946342" cy="922511"/>
+          </a:xfrm>
+          <a:prstGeom prst="rect">
+            <a:avLst/>
+          </a:prstGeom>
+          <a:noFill/>
+        </p:spPr>
+        <p:txBody>
+          <a:bodyPr wrap="square" rtlCol="0">
+            <a:spAutoFit/>
+          </a:bodyPr>
+          <a:lstStyle/>
+          <a:p>
+            <a:r>
+              <a:rPr lang="en-US"/>
+              <a:t>There are very few false positives (predicted value was ‘Yes’, but actual value was ‘No’), but many false negatives (predicted value was ‘No’, when the actual value was ‘Yes’). The model was very accurate at predicting ‘No’, but performed poorly when it came to predicting ‘Yes’. </a:t>
+            </a:r>
+            <a:endParaRPr lang="en-US" dirty="0"/>
+          </a:p>
+        </p:txBody>
+      </p:sp>
     </p:spTree>
     <p:extLst>
       <p:ext uri="{BB962C8B-B14F-4D97-AF65-F5344CB8AC3E}">
-        <p14:creationId xmlns:p14="http://schemas.microsoft.com/office/powerpoint/2010/main" val="3752857098"/>
+        <p14:creationId xmlns:p14="http://schemas.microsoft.com/office/powerpoint/2010/main" val="4141791654"/>
       </p:ext>
     </p:extLst>
   </p:cSld>
@@ -2099,7 +2239,7 @@
                   <a:srgbClr val="FF6600"/>
                 </a:solidFill>
               </a:rPr>
-              <a:t>Model Evaluation: Selecting the Best Model</a:t>
+              <a:t>Random Forest</a:t>
             </a:r>
           </a:p>
         </p:txBody>
@@ -2188,10 +2328,46 @@
           </a:prstGeom>
         </p:spPr>
       </p:pic>
+      <p:pic>
+        <p:nvPicPr>
+          <p:cNvPr id="6" name="Picture 5" descr="Chart, bar chart&#10;&#10;Description automatically generated">
+            <a:extLst>
+              <a:ext uri="{FF2B5EF4-FFF2-40B4-BE49-F238E27FC236}">
+                <a16:creationId xmlns:a16="http://schemas.microsoft.com/office/drawing/2014/main" id="{8040B325-770B-5BBA-4542-A93B6680CC86}"/>
+              </a:ext>
+            </a:extLst>
+          </p:cNvPr>
+          <p:cNvPicPr>
+            <a:picLocks noChangeAspect="1"/>
+          </p:cNvPicPr>
+          <p:nvPr/>
+        </p:nvPicPr>
+        <p:blipFill>
+          <a:blip r:embed="rId3">
+            <a:extLst>
+              <a:ext uri="{28A0092B-C50C-407E-A947-70E740481C1C}">
+                <a14:useLocalDpi xmlns:a14="http://schemas.microsoft.com/office/drawing/2010/main" val="0"/>
+              </a:ext>
+            </a:extLst>
+          </a:blip>
+          <a:stretch>
+            <a:fillRect/>
+          </a:stretch>
+        </p:blipFill>
+        <p:spPr>
+          <a:xfrm>
+            <a:off x="2587307" y="2506502"/>
+            <a:ext cx="7060317" cy="3631746"/>
+          </a:xfrm>
+          <a:prstGeom prst="rect">
+            <a:avLst/>
+          </a:prstGeom>
+        </p:spPr>
+      </p:pic>
     </p:spTree>
     <p:extLst>
       <p:ext uri="{BB962C8B-B14F-4D97-AF65-F5344CB8AC3E}">
-        <p14:creationId xmlns:p14="http://schemas.microsoft.com/office/powerpoint/2010/main" val="3154678756"/>
+        <p14:creationId xmlns:p14="http://schemas.microsoft.com/office/powerpoint/2010/main" val="2661989101"/>
       </p:ext>
     </p:extLst>
   </p:cSld>
@@ -2263,7 +2439,7 @@
                   <a:srgbClr val="FF6600"/>
                 </a:solidFill>
               </a:rPr>
-              <a:t>Model Evaluation: Selecting the Best Model</a:t>
+              <a:t>Random Forest</a:t>
             </a:r>
           </a:p>
         </p:txBody>
@@ -2352,10 +2528,119 @@
           </a:prstGeom>
         </p:spPr>
       </p:pic>
+      <p:pic>
+        <p:nvPicPr>
+          <p:cNvPr id="6" name="Picture 5">
+            <a:extLst>
+              <a:ext uri="{FF2B5EF4-FFF2-40B4-BE49-F238E27FC236}">
+                <a16:creationId xmlns:a16="http://schemas.microsoft.com/office/drawing/2014/main" id="{8040B325-770B-5BBA-4542-A93B6680CC86}"/>
+              </a:ext>
+            </a:extLst>
+          </p:cNvPr>
+          <p:cNvPicPr>
+            <a:picLocks noChangeAspect="1"/>
+          </p:cNvPicPr>
+          <p:nvPr/>
+        </p:nvPicPr>
+        <p:blipFill>
+          <a:blip r:embed="rId3">
+            <a:extLst>
+              <a:ext uri="{28A0092B-C50C-407E-A947-70E740481C1C}">
+                <a14:useLocalDpi xmlns:a14="http://schemas.microsoft.com/office/drawing/2010/main" val="0"/>
+              </a:ext>
+            </a:extLst>
+          </a:blip>
+          <a:srcRect/>
+          <a:stretch/>
+        </p:blipFill>
+        <p:spPr>
+          <a:xfrm>
+            <a:off x="399920" y="2400022"/>
+            <a:ext cx="5355422" cy="3283602"/>
+          </a:xfrm>
+          <a:prstGeom prst="rect">
+            <a:avLst/>
+          </a:prstGeom>
+        </p:spPr>
+      </p:pic>
+      <p:pic>
+        <p:nvPicPr>
+          <p:cNvPr id="7" name="Picture 6" descr="Chart, treemap chart&#10;&#10;Description automatically generated">
+            <a:extLst>
+              <a:ext uri="{FF2B5EF4-FFF2-40B4-BE49-F238E27FC236}">
+                <a16:creationId xmlns:a16="http://schemas.microsoft.com/office/drawing/2014/main" id="{A08ED946-E0FA-539C-7FF7-C7647B35CAA1}"/>
+              </a:ext>
+            </a:extLst>
+          </p:cNvPr>
+          <p:cNvPicPr>
+            <a:picLocks noChangeAspect="1"/>
+          </p:cNvPicPr>
+          <p:nvPr/>
+        </p:nvPicPr>
+        <p:blipFill>
+          <a:blip r:embed="rId4">
+            <a:extLst>
+              <a:ext uri="{28A0092B-C50C-407E-A947-70E740481C1C}">
+                <a14:useLocalDpi xmlns:a14="http://schemas.microsoft.com/office/drawing/2010/main" val="0"/>
+              </a:ext>
+            </a:extLst>
+          </a:blip>
+          <a:stretch>
+            <a:fillRect/>
+          </a:stretch>
+        </p:blipFill>
+        <p:spPr>
+          <a:xfrm>
+            <a:off x="6326955" y="2052918"/>
+            <a:ext cx="5264410" cy="3810853"/>
+          </a:xfrm>
+          <a:prstGeom prst="rect">
+            <a:avLst/>
+          </a:prstGeom>
+        </p:spPr>
+      </p:pic>
+      <p:sp>
+        <p:nvSpPr>
+          <p:cNvPr id="8" name="TextBox 7">
+            <a:extLst>
+              <a:ext uri="{FF2B5EF4-FFF2-40B4-BE49-F238E27FC236}">
+                <a16:creationId xmlns:a16="http://schemas.microsoft.com/office/drawing/2014/main" id="{B0E9B32F-5BB1-E0C6-12B8-62C9FF27DA53}"/>
+              </a:ext>
+            </a:extLst>
+          </p:cNvPr>
+          <p:cNvSpPr txBox="1"/>
+          <p:nvPr/>
+        </p:nvSpPr>
+        <p:spPr>
+          <a:xfrm>
+            <a:off x="1999129" y="5816753"/>
+            <a:ext cx="9792951" cy="1107996"/>
+          </a:xfrm>
+          <a:prstGeom prst="rect">
+            <a:avLst/>
+          </a:prstGeom>
+          <a:noFill/>
+        </p:spPr>
+        <p:txBody>
+          <a:bodyPr wrap="square" rtlCol="0">
+            <a:spAutoFit/>
+          </a:bodyPr>
+          <a:lstStyle/>
+          <a:p>
+            <a:r>
+              <a:rPr lang="en-US" sz="1600" dirty="0"/>
+              <a:t>There are very few false positives (predicted value was ‘Yes’, but actual value was ‘No’), but many false negatives (predicted value was ‘No’, when the actual value was ‘Yes’). The model was very accurate at predicting ‘No’, but performed poorly when it came to predicting ‘Yes’. </a:t>
+            </a:r>
+          </a:p>
+          <a:p>
+            <a:endParaRPr lang="en-US" dirty="0"/>
+          </a:p>
+        </p:txBody>
+      </p:sp>
     </p:spTree>
     <p:extLst>
       <p:ext uri="{BB962C8B-B14F-4D97-AF65-F5344CB8AC3E}">
-        <p14:creationId xmlns:p14="http://schemas.microsoft.com/office/powerpoint/2010/main" val="597594355"/>
+        <p14:creationId xmlns:p14="http://schemas.microsoft.com/office/powerpoint/2010/main" val="1759213583"/>
       </p:ext>
     </p:extLst>
   </p:cSld>
@@ -2427,7 +2712,7 @@
                   <a:srgbClr val="FF6600"/>
                 </a:solidFill>
               </a:rPr>
-              <a:t>Results</a:t>
+              <a:t>Artificial Neural Network</a:t>
             </a:r>
           </a:p>
         </p:txBody>
@@ -2516,6 +2801,677 @@
           </a:prstGeom>
         </p:spPr>
       </p:pic>
+      <p:pic>
+        <p:nvPicPr>
+          <p:cNvPr id="6" name="Picture 5" descr="A screenshot of a computer&#10;&#10;Description automatically generated with low confidence">
+            <a:extLst>
+              <a:ext uri="{FF2B5EF4-FFF2-40B4-BE49-F238E27FC236}">
+                <a16:creationId xmlns:a16="http://schemas.microsoft.com/office/drawing/2014/main" id="{1EC51788-98F0-F391-4EDE-328B9C5388A6}"/>
+              </a:ext>
+            </a:extLst>
+          </p:cNvPr>
+          <p:cNvPicPr>
+            <a:picLocks noChangeAspect="1"/>
+          </p:cNvPicPr>
+          <p:nvPr/>
+        </p:nvPicPr>
+        <p:blipFill>
+          <a:blip r:embed="rId3">
+            <a:extLst>
+              <a:ext uri="{28A0092B-C50C-407E-A947-70E740481C1C}">
+                <a14:useLocalDpi xmlns:a14="http://schemas.microsoft.com/office/drawing/2010/main" val="0"/>
+              </a:ext>
+            </a:extLst>
+          </a:blip>
+          <a:stretch>
+            <a:fillRect/>
+          </a:stretch>
+        </p:blipFill>
+        <p:spPr>
+          <a:xfrm>
+            <a:off x="237565" y="2423419"/>
+            <a:ext cx="4948517" cy="3066859"/>
+          </a:xfrm>
+          <a:prstGeom prst="rect">
+            <a:avLst/>
+          </a:prstGeom>
+        </p:spPr>
+      </p:pic>
+      <p:pic>
+        <p:nvPicPr>
+          <p:cNvPr id="8" name="Picture 7" descr="Chart&#10;&#10;Description automatically generated">
+            <a:extLst>
+              <a:ext uri="{FF2B5EF4-FFF2-40B4-BE49-F238E27FC236}">
+                <a16:creationId xmlns:a16="http://schemas.microsoft.com/office/drawing/2014/main" id="{C6F966E8-81B6-3FB6-CAC1-683EB7AAE78A}"/>
+              </a:ext>
+            </a:extLst>
+          </p:cNvPr>
+          <p:cNvPicPr>
+            <a:picLocks noChangeAspect="1"/>
+          </p:cNvPicPr>
+          <p:nvPr/>
+        </p:nvPicPr>
+        <p:blipFill>
+          <a:blip r:embed="rId4">
+            <a:extLst>
+              <a:ext uri="{28A0092B-C50C-407E-A947-70E740481C1C}">
+                <a14:useLocalDpi xmlns:a14="http://schemas.microsoft.com/office/drawing/2010/main" val="0"/>
+              </a:ext>
+            </a:extLst>
+          </a:blip>
+          <a:stretch>
+            <a:fillRect/>
+          </a:stretch>
+        </p:blipFill>
+        <p:spPr>
+          <a:xfrm>
+            <a:off x="5558118" y="2151529"/>
+            <a:ext cx="6100483" cy="3563471"/>
+          </a:xfrm>
+          <a:prstGeom prst="rect">
+            <a:avLst/>
+          </a:prstGeom>
+        </p:spPr>
+      </p:pic>
+      <p:sp>
+        <p:nvSpPr>
+          <p:cNvPr id="9" name="TextBox 8">
+            <a:extLst>
+              <a:ext uri="{FF2B5EF4-FFF2-40B4-BE49-F238E27FC236}">
+                <a16:creationId xmlns:a16="http://schemas.microsoft.com/office/drawing/2014/main" id="{0C525805-553E-07F8-DEC4-1C689362DB55}"/>
+              </a:ext>
+            </a:extLst>
+          </p:cNvPr>
+          <p:cNvSpPr txBox="1"/>
+          <p:nvPr/>
+        </p:nvSpPr>
+        <p:spPr>
+          <a:xfrm>
+            <a:off x="2034988" y="5715000"/>
+            <a:ext cx="9318813" cy="923330"/>
+          </a:xfrm>
+          <a:prstGeom prst="rect">
+            <a:avLst/>
+          </a:prstGeom>
+          <a:noFill/>
+        </p:spPr>
+        <p:txBody>
+          <a:bodyPr wrap="square" rtlCol="0">
+            <a:spAutoFit/>
+          </a:bodyPr>
+          <a:lstStyle/>
+          <a:p>
+            <a:r>
+              <a:rPr lang="en-US" dirty="0"/>
+              <a:t>There are very few false positives (predicted value was ‘Yes’, but actual value was ‘No’), but many false negatives (predicted value was ‘No’, when the actual value was ‘Yes’). </a:t>
+            </a:r>
+            <a:r>
+              <a:rPr lang="en-US" dirty="0" err="1"/>
+              <a:t>The</a:t>
+            </a:r>
+            <a:r>
+              <a:rPr lang="en-US" dirty="0"/>
+              <a:t> model was very accurate at predicting ‘No’, but performed poorly when it came to predicting ‘Yes’. </a:t>
+            </a:r>
+          </a:p>
+        </p:txBody>
+      </p:sp>
+    </p:spTree>
+    <p:extLst>
+      <p:ext uri="{BB962C8B-B14F-4D97-AF65-F5344CB8AC3E}">
+        <p14:creationId xmlns:p14="http://schemas.microsoft.com/office/powerpoint/2010/main" val="3752857098"/>
+      </p:ext>
+    </p:extLst>
+  </p:cSld>
+  <p:clrMapOvr>
+    <a:masterClrMapping/>
+  </p:clrMapOvr>
+</p:sld>
+</file>
+
+<file path=ppt/slides/slide17.xml><?xml version="1.0" encoding="utf-8"?>
+<p:sld xmlns:a="http://schemas.openxmlformats.org/drawingml/2006/main" xmlns:r="http://schemas.openxmlformats.org/officeDocument/2006/relationships" xmlns:p="http://schemas.openxmlformats.org/presentationml/2006/main">
+  <p:cSld>
+    <p:spTree>
+      <p:nvGrpSpPr>
+        <p:cNvPr id="1" name=""/>
+        <p:cNvGrpSpPr/>
+        <p:nvPr/>
+      </p:nvGrpSpPr>
+      <p:grpSpPr>
+        <a:xfrm>
+          <a:off x="0" y="0"/>
+          <a:ext cx="0" cy="0"/>
+          <a:chOff x="0" y="0"/>
+          <a:chExt cx="0" cy="0"/>
+        </a:xfrm>
+      </p:grpSpPr>
+      <p:sp>
+        <p:nvSpPr>
+          <p:cNvPr id="2" name="Title 1">
+            <a:extLst>
+              <a:ext uri="{FF2B5EF4-FFF2-40B4-BE49-F238E27FC236}">
+                <a16:creationId xmlns:a16="http://schemas.microsoft.com/office/drawing/2014/main" id="{E8B8F26E-9345-4747-9094-972E38700A17}"/>
+              </a:ext>
+            </a:extLst>
+          </p:cNvPr>
+          <p:cNvSpPr>
+            <a:spLocks noGrp="1"/>
+          </p:cNvSpPr>
+          <p:nvPr>
+            <p:ph type="title"/>
+          </p:nvPr>
+        </p:nvSpPr>
+        <p:spPr>
+          <a:xfrm rot="5400000">
+            <a:off x="5278191" y="-5243846"/>
+            <a:ext cx="1678550" cy="12234932"/>
+          </a:xfrm>
+          <a:solidFill>
+            <a:srgbClr val="3B3B3B"/>
+          </a:solidFill>
+        </p:spPr>
+        <p:txBody>
+          <a:bodyPr vert="vert270" anchor="t" anchorCtr="0">
+            <a:normAutofit/>
+          </a:bodyPr>
+          <a:lstStyle/>
+          <a:p>
+            <a:pPr algn="ctr"/>
+            <a:br>
+              <a:rPr lang="en-US" b="1" dirty="0">
+                <a:solidFill>
+                  <a:srgbClr val="FF6600"/>
+                </a:solidFill>
+              </a:rPr>
+            </a:br>
+            <a:r>
+              <a:rPr lang="en-US" b="1" dirty="0">
+                <a:solidFill>
+                  <a:srgbClr val="FF6600"/>
+                </a:solidFill>
+              </a:rPr>
+              <a:t>Model Evaluation: Selecting the Best Model</a:t>
+            </a:r>
+          </a:p>
+        </p:txBody>
+      </p:sp>
+      <p:sp>
+        <p:nvSpPr>
+          <p:cNvPr id="3" name="Subtitle 2">
+            <a:extLst>
+              <a:ext uri="{FF2B5EF4-FFF2-40B4-BE49-F238E27FC236}">
+                <a16:creationId xmlns:a16="http://schemas.microsoft.com/office/drawing/2014/main" id="{60B3D5A6-E766-7C41-BD00-B22DA4727FBA}"/>
+              </a:ext>
+            </a:extLst>
+          </p:cNvPr>
+          <p:cNvSpPr>
+            <a:spLocks noGrp="1"/>
+          </p:cNvSpPr>
+          <p:nvPr>
+            <p:ph idx="1"/>
+          </p:nvPr>
+        </p:nvSpPr>
+        <p:spPr>
+          <a:xfrm rot="5400000">
+            <a:off x="4235751" y="-1311163"/>
+            <a:ext cx="3777382" cy="10572485"/>
+          </a:xfrm>
+          <a:noFill/>
+        </p:spPr>
+        <p:txBody>
+          <a:bodyPr vert="vert270">
+            <a:normAutofit/>
+          </a:bodyPr>
+          <a:lstStyle/>
+          <a:p>
+            <a:endParaRPr lang="en-US" dirty="0">
+              <a:solidFill>
+                <a:srgbClr val="FF6600"/>
+              </a:solidFill>
+            </a:endParaRPr>
+          </a:p>
+          <a:p>
+            <a:pPr lvl="1"/>
+            <a:endParaRPr lang="en-US" sz="2000" dirty="0"/>
+          </a:p>
+          <a:p>
+            <a:endParaRPr lang="en-US" dirty="0">
+              <a:solidFill>
+                <a:srgbClr val="FF6600"/>
+              </a:solidFill>
+            </a:endParaRPr>
+          </a:p>
+        </p:txBody>
+      </p:sp>
+      <p:pic>
+        <p:nvPicPr>
+          <p:cNvPr id="4" name="Picture 3">
+            <a:extLst>
+              <a:ext uri="{FF2B5EF4-FFF2-40B4-BE49-F238E27FC236}">
+                <a16:creationId xmlns:a16="http://schemas.microsoft.com/office/drawing/2014/main" id="{7A465064-0714-5743-882B-8875105A7023}"/>
+              </a:ext>
+            </a:extLst>
+          </p:cNvPr>
+          <p:cNvPicPr>
+            <a:picLocks noChangeAspect="1"/>
+          </p:cNvPicPr>
+          <p:nvPr/>
+        </p:nvPicPr>
+        <p:blipFill>
+          <a:blip r:embed="rId2" cstate="print">
+            <a:extLst>
+              <a:ext uri="{28A0092B-C50C-407E-A947-70E740481C1C}">
+                <a14:useLocalDpi xmlns:a14="http://schemas.microsoft.com/office/drawing/2010/main" val="0"/>
+              </a:ext>
+            </a:extLst>
+          </a:blip>
+          <a:stretch>
+            <a:fillRect/>
+          </a:stretch>
+        </p:blipFill>
+        <p:spPr>
+          <a:xfrm>
+            <a:off x="0" y="5863771"/>
+            <a:ext cx="1654627" cy="994232"/>
+          </a:xfrm>
+          <a:prstGeom prst="rect">
+            <a:avLst/>
+          </a:prstGeom>
+        </p:spPr>
+      </p:pic>
+      <p:sp>
+        <p:nvSpPr>
+          <p:cNvPr id="5" name="TextBox 4">
+            <a:extLst>
+              <a:ext uri="{FF2B5EF4-FFF2-40B4-BE49-F238E27FC236}">
+                <a16:creationId xmlns:a16="http://schemas.microsoft.com/office/drawing/2014/main" id="{77BF0EC6-DE99-D36D-6270-3B19B80BC3D5}"/>
+              </a:ext>
+            </a:extLst>
+          </p:cNvPr>
+          <p:cNvSpPr txBox="1"/>
+          <p:nvPr/>
+        </p:nvSpPr>
+        <p:spPr>
+          <a:xfrm>
+            <a:off x="1044388" y="2205318"/>
+            <a:ext cx="10215283" cy="2123658"/>
+          </a:xfrm>
+          <a:prstGeom prst="rect">
+            <a:avLst/>
+          </a:prstGeom>
+          <a:noFill/>
+        </p:spPr>
+        <p:txBody>
+          <a:bodyPr wrap="square" rtlCol="0">
+            <a:spAutoFit/>
+          </a:bodyPr>
+          <a:lstStyle/>
+          <a:p>
+            <a:r>
+              <a:rPr lang="en-US" sz="2400" dirty="0"/>
+              <a:t>All 3 of the models had roughly the same accuracy of </a:t>
+            </a:r>
+            <a:r>
+              <a:rPr lang="en-US" sz="2400" b="1" dirty="0"/>
+              <a:t>89%</a:t>
+            </a:r>
+            <a:r>
+              <a:rPr lang="en-US" sz="2400" dirty="0"/>
+              <a:t>. The Artificial Neural Network was slightly better at predicting ‘Yes’ than the other models, but all 3 models had very similar precision, recall, and overall accuracy. We can use any of the 3 models to predict whether a client will subscribe for a term deposit.</a:t>
+            </a:r>
+          </a:p>
+          <a:p>
+            <a:endParaRPr lang="en-US" dirty="0"/>
+          </a:p>
+          <a:p>
+            <a:endParaRPr lang="en-US" dirty="0"/>
+          </a:p>
+        </p:txBody>
+      </p:sp>
+    </p:spTree>
+    <p:extLst>
+      <p:ext uri="{BB962C8B-B14F-4D97-AF65-F5344CB8AC3E}">
+        <p14:creationId xmlns:p14="http://schemas.microsoft.com/office/powerpoint/2010/main" val="3154678756"/>
+      </p:ext>
+    </p:extLst>
+  </p:cSld>
+  <p:clrMapOvr>
+    <a:masterClrMapping/>
+  </p:clrMapOvr>
+</p:sld>
+</file>
+
+<file path=ppt/slides/slide18.xml><?xml version="1.0" encoding="utf-8"?>
+<p:sld xmlns:a="http://schemas.openxmlformats.org/drawingml/2006/main" xmlns:r="http://schemas.openxmlformats.org/officeDocument/2006/relationships" xmlns:p="http://schemas.openxmlformats.org/presentationml/2006/main">
+  <p:cSld>
+    <p:spTree>
+      <p:nvGrpSpPr>
+        <p:cNvPr id="1" name=""/>
+        <p:cNvGrpSpPr/>
+        <p:nvPr/>
+      </p:nvGrpSpPr>
+      <p:grpSpPr>
+        <a:xfrm>
+          <a:off x="0" y="0"/>
+          <a:ext cx="0" cy="0"/>
+          <a:chOff x="0" y="0"/>
+          <a:chExt cx="0" cy="0"/>
+        </a:xfrm>
+      </p:grpSpPr>
+      <p:sp>
+        <p:nvSpPr>
+          <p:cNvPr id="2" name="Title 1">
+            <a:extLst>
+              <a:ext uri="{FF2B5EF4-FFF2-40B4-BE49-F238E27FC236}">
+                <a16:creationId xmlns:a16="http://schemas.microsoft.com/office/drawing/2014/main" id="{E8B8F26E-9345-4747-9094-972E38700A17}"/>
+              </a:ext>
+            </a:extLst>
+          </p:cNvPr>
+          <p:cNvSpPr>
+            <a:spLocks noGrp="1"/>
+          </p:cNvSpPr>
+          <p:nvPr>
+            <p:ph type="title"/>
+          </p:nvPr>
+        </p:nvSpPr>
+        <p:spPr>
+          <a:xfrm rot="5400000">
+            <a:off x="5278191" y="-5243846"/>
+            <a:ext cx="1678550" cy="12234932"/>
+          </a:xfrm>
+          <a:solidFill>
+            <a:srgbClr val="3B3B3B"/>
+          </a:solidFill>
+        </p:spPr>
+        <p:txBody>
+          <a:bodyPr vert="vert270" anchor="t" anchorCtr="0">
+            <a:normAutofit/>
+          </a:bodyPr>
+          <a:lstStyle/>
+          <a:p>
+            <a:pPr algn="ctr"/>
+            <a:br>
+              <a:rPr lang="en-US" b="1" dirty="0">
+                <a:solidFill>
+                  <a:srgbClr val="FF6600"/>
+                </a:solidFill>
+              </a:rPr>
+            </a:br>
+            <a:r>
+              <a:rPr lang="en-US" b="1" dirty="0">
+                <a:solidFill>
+                  <a:srgbClr val="FF6600"/>
+                </a:solidFill>
+              </a:rPr>
+              <a:t>Results</a:t>
+            </a:r>
+          </a:p>
+        </p:txBody>
+      </p:sp>
+      <p:sp>
+        <p:nvSpPr>
+          <p:cNvPr id="3" name="Subtitle 2">
+            <a:extLst>
+              <a:ext uri="{FF2B5EF4-FFF2-40B4-BE49-F238E27FC236}">
+                <a16:creationId xmlns:a16="http://schemas.microsoft.com/office/drawing/2014/main" id="{60B3D5A6-E766-7C41-BD00-B22DA4727FBA}"/>
+              </a:ext>
+            </a:extLst>
+          </p:cNvPr>
+          <p:cNvSpPr>
+            <a:spLocks noGrp="1"/>
+          </p:cNvSpPr>
+          <p:nvPr>
+            <p:ph idx="1"/>
+          </p:nvPr>
+        </p:nvSpPr>
+        <p:spPr>
+          <a:xfrm rot="5400000">
+            <a:off x="5367970" y="-2443382"/>
+            <a:ext cx="1512943" cy="10572485"/>
+          </a:xfrm>
+          <a:noFill/>
+        </p:spPr>
+        <p:txBody>
+          <a:bodyPr vert="vert270">
+            <a:normAutofit/>
+          </a:bodyPr>
+          <a:lstStyle/>
+          <a:p>
+            <a:endParaRPr lang="en-US" dirty="0">
+              <a:solidFill>
+                <a:srgbClr val="FF6600"/>
+              </a:solidFill>
+            </a:endParaRPr>
+          </a:p>
+          <a:p>
+            <a:pPr lvl="1"/>
+            <a:endParaRPr lang="en-US" sz="2000" dirty="0"/>
+          </a:p>
+          <a:p>
+            <a:pPr marL="0" indent="0">
+              <a:buNone/>
+            </a:pPr>
+            <a:endParaRPr lang="en-US" dirty="0">
+              <a:solidFill>
+                <a:srgbClr val="FF6600"/>
+              </a:solidFill>
+            </a:endParaRPr>
+          </a:p>
+        </p:txBody>
+      </p:sp>
+      <p:pic>
+        <p:nvPicPr>
+          <p:cNvPr id="4" name="Picture 3">
+            <a:extLst>
+              <a:ext uri="{FF2B5EF4-FFF2-40B4-BE49-F238E27FC236}">
+                <a16:creationId xmlns:a16="http://schemas.microsoft.com/office/drawing/2014/main" id="{7A465064-0714-5743-882B-8875105A7023}"/>
+              </a:ext>
+            </a:extLst>
+          </p:cNvPr>
+          <p:cNvPicPr>
+            <a:picLocks noChangeAspect="1"/>
+          </p:cNvPicPr>
+          <p:nvPr/>
+        </p:nvPicPr>
+        <p:blipFill>
+          <a:blip r:embed="rId2" cstate="print">
+            <a:extLst>
+              <a:ext uri="{28A0092B-C50C-407E-A947-70E740481C1C}">
+                <a14:useLocalDpi xmlns:a14="http://schemas.microsoft.com/office/drawing/2010/main" val="0"/>
+              </a:ext>
+            </a:extLst>
+          </a:blip>
+          <a:stretch>
+            <a:fillRect/>
+          </a:stretch>
+        </p:blipFill>
+        <p:spPr>
+          <a:xfrm>
+            <a:off x="0" y="5863771"/>
+            <a:ext cx="1654627" cy="994232"/>
+          </a:xfrm>
+          <a:prstGeom prst="rect">
+            <a:avLst/>
+          </a:prstGeom>
+        </p:spPr>
+      </p:pic>
+      <p:sp>
+        <p:nvSpPr>
+          <p:cNvPr id="5" name="TextBox 4">
+            <a:extLst>
+              <a:ext uri="{FF2B5EF4-FFF2-40B4-BE49-F238E27FC236}">
+                <a16:creationId xmlns:a16="http://schemas.microsoft.com/office/drawing/2014/main" id="{1AB19484-0F4D-9684-C047-2C66E9EB629A}"/>
+              </a:ext>
+            </a:extLst>
+          </p:cNvPr>
+          <p:cNvSpPr txBox="1"/>
+          <p:nvPr/>
+        </p:nvSpPr>
+        <p:spPr>
+          <a:xfrm>
+            <a:off x="838199" y="2003612"/>
+            <a:ext cx="10676966" cy="2031325"/>
+          </a:xfrm>
+          <a:prstGeom prst="rect">
+            <a:avLst/>
+          </a:prstGeom>
+          <a:noFill/>
+        </p:spPr>
+        <p:txBody>
+          <a:bodyPr wrap="square" rtlCol="0">
+            <a:spAutoFit/>
+          </a:bodyPr>
+          <a:lstStyle/>
+          <a:p>
+            <a:r>
+              <a:rPr lang="en-US" dirty="0"/>
+              <a:t>According to the results of the Logistic Regression Model, clients are </a:t>
+            </a:r>
+            <a:r>
+              <a:rPr lang="en-US" b="1" dirty="0"/>
+              <a:t>more likely to subscribe for a term deposit </a:t>
+            </a:r>
+            <a:r>
+              <a:rPr lang="en-US" dirty="0"/>
+              <a:t>if:</a:t>
+            </a:r>
+          </a:p>
+          <a:p>
+            <a:pPr marL="285750" indent="-285750">
+              <a:buFont typeface="Arial" panose="020B0604020202020204" pitchFamily="34" charset="0"/>
+              <a:buChar char="•"/>
+            </a:pPr>
+            <a:r>
+              <a:rPr lang="en-US" dirty="0"/>
+              <a:t> The outcome of the previous campaign was successful</a:t>
+            </a:r>
+          </a:p>
+          <a:p>
+            <a:pPr marL="285750" indent="-285750">
+              <a:buFont typeface="Arial" panose="020B0604020202020204" pitchFamily="34" charset="0"/>
+              <a:buChar char="•"/>
+            </a:pPr>
+            <a:r>
+              <a:rPr lang="en-US" dirty="0"/>
+              <a:t>It is the month of March, October, September, or December (from most likely to least likely)</a:t>
+            </a:r>
+          </a:p>
+          <a:p>
+            <a:pPr marL="285750" indent="-285750">
+              <a:buFont typeface="Arial" panose="020B0604020202020204" pitchFamily="34" charset="0"/>
+              <a:buChar char="•"/>
+            </a:pPr>
+            <a:r>
+              <a:rPr lang="en-US" dirty="0"/>
+              <a:t>They are contacted by cell phone</a:t>
+            </a:r>
+          </a:p>
+          <a:p>
+            <a:pPr marL="285750" indent="-285750">
+              <a:buFont typeface="Arial" panose="020B0604020202020204" pitchFamily="34" charset="0"/>
+              <a:buChar char="•"/>
+            </a:pPr>
+            <a:r>
+              <a:rPr lang="en-US" dirty="0"/>
+              <a:t>They are retired or a student</a:t>
+            </a:r>
+          </a:p>
+          <a:p>
+            <a:pPr marL="285750" indent="-285750">
+              <a:buFont typeface="Arial" panose="020B0604020202020204" pitchFamily="34" charset="0"/>
+              <a:buChar char="•"/>
+            </a:pPr>
+            <a:endParaRPr lang="en-US" dirty="0"/>
+          </a:p>
+        </p:txBody>
+      </p:sp>
+      <p:sp>
+        <p:nvSpPr>
+          <p:cNvPr id="6" name="TextBox 5">
+            <a:extLst>
+              <a:ext uri="{FF2B5EF4-FFF2-40B4-BE49-F238E27FC236}">
+                <a16:creationId xmlns:a16="http://schemas.microsoft.com/office/drawing/2014/main" id="{8D9820DE-5DEC-85DA-B606-C72C0D4B605C}"/>
+              </a:ext>
+            </a:extLst>
+          </p:cNvPr>
+          <p:cNvSpPr txBox="1"/>
+          <p:nvPr/>
+        </p:nvSpPr>
+        <p:spPr>
+          <a:xfrm>
+            <a:off x="838200" y="3850341"/>
+            <a:ext cx="10676966" cy="1754326"/>
+          </a:xfrm>
+          <a:prstGeom prst="rect">
+            <a:avLst/>
+          </a:prstGeom>
+          <a:noFill/>
+        </p:spPr>
+        <p:txBody>
+          <a:bodyPr wrap="square" rtlCol="0">
+            <a:spAutoFit/>
+          </a:bodyPr>
+          <a:lstStyle/>
+          <a:p>
+            <a:r>
+              <a:rPr lang="en-US" dirty="0"/>
+              <a:t>According to the results of the Logistic Regression Model, clients are </a:t>
+            </a:r>
+            <a:r>
+              <a:rPr lang="en-US" b="1" dirty="0"/>
+              <a:t>less likely to subscribe for a term deposit </a:t>
+            </a:r>
+            <a:r>
+              <a:rPr lang="en-US" dirty="0"/>
+              <a:t>if:</a:t>
+            </a:r>
+          </a:p>
+          <a:p>
+            <a:pPr marL="285750" indent="-285750">
+              <a:buFont typeface="Arial" panose="020B0604020202020204" pitchFamily="34" charset="0"/>
+              <a:buChar char="•"/>
+            </a:pPr>
+            <a:r>
+              <a:rPr lang="en-US" dirty="0"/>
+              <a:t> It is the month of January, November, August, or July (from least likely to most likely)</a:t>
+            </a:r>
+          </a:p>
+          <a:p>
+            <a:pPr marL="285750" indent="-285750">
+              <a:buFont typeface="Arial" panose="020B0604020202020204" pitchFamily="34" charset="0"/>
+              <a:buChar char="•"/>
+            </a:pPr>
+            <a:r>
+              <a:rPr lang="en-US" dirty="0"/>
+              <a:t>Method of contact is unknown</a:t>
+            </a:r>
+          </a:p>
+          <a:p>
+            <a:pPr marL="285750" indent="-285750">
+              <a:buFont typeface="Arial" panose="020B0604020202020204" pitchFamily="34" charset="0"/>
+              <a:buChar char="•"/>
+            </a:pPr>
+            <a:r>
+              <a:rPr lang="en-US" dirty="0"/>
+              <a:t>The outcome of the previous campaign was a failure or unknown</a:t>
+            </a:r>
+          </a:p>
+          <a:p>
+            <a:pPr marL="285750" indent="-285750">
+              <a:buFont typeface="Arial" panose="020B0604020202020204" pitchFamily="34" charset="0"/>
+              <a:buChar char="•"/>
+            </a:pPr>
+            <a:r>
+              <a:rPr lang="en-US" dirty="0"/>
+              <a:t>The client has a housing loan or personal loan</a:t>
+            </a:r>
+          </a:p>
+          <a:p>
+            <a:endParaRPr lang="en-US" dirty="0"/>
+          </a:p>
+        </p:txBody>
+      </p:sp>
     </p:spTree>
     <p:extLst>
       <p:ext uri="{BB962C8B-B14F-4D97-AF65-F5344CB8AC3E}">
@@ -2621,7 +3577,7 @@
         </p:spPr>
         <p:txBody>
           <a:bodyPr vert="vert270">
-            <a:normAutofit lnSpcReduction="10000"/>
+            <a:normAutofit fontScale="92500" lnSpcReduction="20000"/>
           </a:bodyPr>
           <a:lstStyle/>
           <a:p>
@@ -2690,7 +3646,21 @@
             <a:pPr lvl="1"/>
             <a:r>
               <a:rPr lang="en-US" sz="2000" dirty="0"/>
-              <a:t>Machine Learning Methods (Random Forest, Artificial Neural Network, Support Vector Machine, Naive Bayes Classifier)</a:t>
+              <a:t>Machine Learning Methods</a:t>
+            </a:r>
+          </a:p>
+          <a:p>
+            <a:pPr lvl="2"/>
+            <a:r>
+              <a:rPr lang="en-US" sz="1600" dirty="0"/>
+              <a:t>Ensemble (Random Forest)</a:t>
+            </a:r>
+          </a:p>
+          <a:p>
+            <a:pPr lvl="2"/>
+            <a:r>
+              <a:rPr lang="en-US" sz="1600" dirty="0"/>
+              <a:t>Deep Learning (Artificial Neural Network)</a:t>
             </a:r>
           </a:p>
           <a:p>
@@ -4273,7 +5243,7 @@
                   <a:srgbClr val="FF6600"/>
                 </a:solidFill>
               </a:rPr>
-              <a:t>Logistic Regression Model</a:t>
+              <a:t>Exploratory Data Analysis</a:t>
             </a:r>
           </a:p>
         </p:txBody>
@@ -4307,13 +5277,6 @@
           </a:bodyPr>
           <a:lstStyle/>
           <a:p>
-            <a:endParaRPr lang="en-US" dirty="0">
-              <a:solidFill>
-                <a:srgbClr val="FF6600"/>
-              </a:solidFill>
-            </a:endParaRPr>
-          </a:p>
-          <a:p>
             <a:pPr lvl="1"/>
             <a:endParaRPr lang="en-US" sz="2000" dirty="0"/>
           </a:p>
@@ -4362,82 +5325,10 @@
           </a:prstGeom>
         </p:spPr>
       </p:pic>
-      <p:pic>
-        <p:nvPicPr>
-          <p:cNvPr id="6" name="Picture 5" descr="Chart, bar chart&#10;&#10;Description automatically generated">
-            <a:extLst>
-              <a:ext uri="{FF2B5EF4-FFF2-40B4-BE49-F238E27FC236}">
-                <a16:creationId xmlns:a16="http://schemas.microsoft.com/office/drawing/2014/main" id="{21F55F23-8673-C5FA-464A-28EE0F762CA2}"/>
-              </a:ext>
-            </a:extLst>
-          </p:cNvPr>
-          <p:cNvPicPr>
-            <a:picLocks noChangeAspect="1"/>
-          </p:cNvPicPr>
-          <p:nvPr/>
-        </p:nvPicPr>
-        <p:blipFill>
-          <a:blip r:embed="rId3">
-            <a:extLst>
-              <a:ext uri="{28A0092B-C50C-407E-A947-70E740481C1C}">
-                <a14:useLocalDpi xmlns:a14="http://schemas.microsoft.com/office/drawing/2010/main" val="0"/>
-              </a:ext>
-            </a:extLst>
-          </a:blip>
-          <a:stretch>
-            <a:fillRect/>
-          </a:stretch>
-        </p:blipFill>
-        <p:spPr>
-          <a:xfrm>
-            <a:off x="598428" y="2086388"/>
-            <a:ext cx="5260007" cy="3631746"/>
-          </a:xfrm>
-          <a:prstGeom prst="rect">
-            <a:avLst/>
-          </a:prstGeom>
-        </p:spPr>
-      </p:pic>
-      <p:pic>
-        <p:nvPicPr>
-          <p:cNvPr id="8" name="Picture 7" descr="Chart&#10;&#10;Description automatically generated">
-            <a:extLst>
-              <a:ext uri="{FF2B5EF4-FFF2-40B4-BE49-F238E27FC236}">
-                <a16:creationId xmlns:a16="http://schemas.microsoft.com/office/drawing/2014/main" id="{DCD49042-9F42-3F38-D1F2-2A725E75D918}"/>
-              </a:ext>
-            </a:extLst>
-          </p:cNvPr>
-          <p:cNvPicPr>
-            <a:picLocks noChangeAspect="1"/>
-          </p:cNvPicPr>
-          <p:nvPr/>
-        </p:nvPicPr>
-        <p:blipFill>
-          <a:blip r:embed="rId4">
-            <a:extLst>
-              <a:ext uri="{28A0092B-C50C-407E-A947-70E740481C1C}">
-                <a14:useLocalDpi xmlns:a14="http://schemas.microsoft.com/office/drawing/2010/main" val="0"/>
-              </a:ext>
-            </a:extLst>
-          </a:blip>
-          <a:stretch>
-            <a:fillRect/>
-          </a:stretch>
-        </p:blipFill>
-        <p:spPr>
-          <a:xfrm>
-            <a:off x="6124442" y="2086388"/>
-            <a:ext cx="5619323" cy="3592753"/>
-          </a:xfrm>
-          <a:prstGeom prst="rect">
-            <a:avLst/>
-          </a:prstGeom>
-        </p:spPr>
-      </p:pic>
     </p:spTree>
     <p:extLst>
       <p:ext uri="{BB962C8B-B14F-4D97-AF65-F5344CB8AC3E}">
-        <p14:creationId xmlns:p14="http://schemas.microsoft.com/office/powerpoint/2010/main" val="2725937870"/>
+        <p14:creationId xmlns:p14="http://schemas.microsoft.com/office/powerpoint/2010/main" val="3501307056"/>
       </p:ext>
     </p:extLst>
   </p:cSld>

</xml_diff>